<commit_message>
REMOVE NN-TAgs from my sheets
</commit_message>
<xml_diff>
--- a/documents/Präsentation/P2Präsentation.pptx
+++ b/documents/Präsentation/P2Präsentation.pptx
@@ -1116,13 +1116,6 @@
         </dgm:presLayoutVars>
       </dgm:prSet>
       <dgm:spPr/>
-      <dgm:t>
-        <a:bodyPr/>
-        <a:lstStyle/>
-        <a:p>
-          <a:endParaRPr lang="de-DE"/>
-        </a:p>
-      </dgm:t>
     </dgm:pt>
     <dgm:pt modelId="{E0DE810A-379A-44CB-9416-569032F9EE21}" type="pres">
       <dgm:prSet presAssocID="{1FD2EDB6-0792-4853-888D-F8E313EC0529}" presName="dummy" presStyleCnt="0"/>
@@ -1135,24 +1128,10 @@
         </dgm:presLayoutVars>
       </dgm:prSet>
       <dgm:spPr/>
-      <dgm:t>
-        <a:bodyPr/>
-        <a:lstStyle/>
-        <a:p>
-          <a:endParaRPr lang="de-DE"/>
-        </a:p>
-      </dgm:t>
     </dgm:pt>
     <dgm:pt modelId="{76CD9CB2-754B-421B-9688-68159FF152A4}" type="pres">
       <dgm:prSet presAssocID="{89E53432-5284-43CA-B572-C3B27F28F77E}" presName="sibTrans" presStyleLbl="node1" presStyleIdx="0" presStyleCnt="4"/>
       <dgm:spPr/>
-      <dgm:t>
-        <a:bodyPr/>
-        <a:lstStyle/>
-        <a:p>
-          <a:endParaRPr lang="de-DE"/>
-        </a:p>
-      </dgm:t>
     </dgm:pt>
     <dgm:pt modelId="{80CAC802-F7CE-48DB-BBE3-4462516FD533}" type="pres">
       <dgm:prSet presAssocID="{9B59FFB9-4CA3-4655-9772-41EDD636DACE}" presName="dummy" presStyleCnt="0"/>
@@ -1165,24 +1144,10 @@
         </dgm:presLayoutVars>
       </dgm:prSet>
       <dgm:spPr/>
-      <dgm:t>
-        <a:bodyPr/>
-        <a:lstStyle/>
-        <a:p>
-          <a:endParaRPr lang="de-DE"/>
-        </a:p>
-      </dgm:t>
     </dgm:pt>
     <dgm:pt modelId="{BD18207A-7BA1-40E1-92DB-54EE626FCB12}" type="pres">
       <dgm:prSet presAssocID="{17DD5161-194B-4BFB-9A02-824349DEE786}" presName="sibTrans" presStyleLbl="node1" presStyleIdx="1" presStyleCnt="4"/>
       <dgm:spPr/>
-      <dgm:t>
-        <a:bodyPr/>
-        <a:lstStyle/>
-        <a:p>
-          <a:endParaRPr lang="de-DE"/>
-        </a:p>
-      </dgm:t>
     </dgm:pt>
     <dgm:pt modelId="{8A121AF6-B928-42E1-A45F-B6A212B61D32}" type="pres">
       <dgm:prSet presAssocID="{32D904E7-4D91-4A2B-8282-A1723FBE0A42}" presName="dummy" presStyleCnt="0"/>
@@ -1195,24 +1160,10 @@
         </dgm:presLayoutVars>
       </dgm:prSet>
       <dgm:spPr/>
-      <dgm:t>
-        <a:bodyPr/>
-        <a:lstStyle/>
-        <a:p>
-          <a:endParaRPr lang="de-DE"/>
-        </a:p>
-      </dgm:t>
     </dgm:pt>
     <dgm:pt modelId="{6DC68B81-6986-465E-89D2-81C8B39EE67E}" type="pres">
       <dgm:prSet presAssocID="{9FF7C395-D9D2-4EF3-9C38-83A96DE78305}" presName="sibTrans" presStyleLbl="node1" presStyleIdx="2" presStyleCnt="4"/>
       <dgm:spPr/>
-      <dgm:t>
-        <a:bodyPr/>
-        <a:lstStyle/>
-        <a:p>
-          <a:endParaRPr lang="de-DE"/>
-        </a:p>
-      </dgm:t>
     </dgm:pt>
     <dgm:pt modelId="{63EEF0A1-D4A5-437E-B8A1-311C7423BC3B}" type="pres">
       <dgm:prSet presAssocID="{6CA7567A-9C21-49E3-A9B6-C6430031F8D4}" presName="dummy" presStyleCnt="0"/>
@@ -1225,39 +1176,25 @@
         </dgm:presLayoutVars>
       </dgm:prSet>
       <dgm:spPr/>
-      <dgm:t>
-        <a:bodyPr/>
-        <a:lstStyle/>
-        <a:p>
-          <a:endParaRPr lang="de-DE"/>
-        </a:p>
-      </dgm:t>
     </dgm:pt>
     <dgm:pt modelId="{BA22C78F-9232-4DE9-9263-C9ADE3A700B4}" type="pres">
       <dgm:prSet presAssocID="{B9D8FB78-52BA-4F13-AD97-614EA4179516}" presName="sibTrans" presStyleLbl="node1" presStyleIdx="3" presStyleCnt="4"/>
       <dgm:spPr/>
-      <dgm:t>
-        <a:bodyPr/>
-        <a:lstStyle/>
-        <a:p>
-          <a:endParaRPr lang="de-DE"/>
-        </a:p>
-      </dgm:t>
     </dgm:pt>
   </dgm:ptLst>
   <dgm:cxnLst>
+    <dgm:cxn modelId="{12D89A08-ED6D-0944-88E6-358492A8DFAC}" type="presOf" srcId="{32D904E7-4D91-4A2B-8282-A1723FBE0A42}" destId="{31678004-4357-4481-BC21-B504B0CE3C71}" srcOrd="0" destOrd="0" presId="urn:microsoft.com/office/officeart/2005/8/layout/cycle1"/>
+    <dgm:cxn modelId="{03E4B62D-F988-504E-AE18-B43539CF3FDC}" type="presOf" srcId="{B9D8FB78-52BA-4F13-AD97-614EA4179516}" destId="{BA22C78F-9232-4DE9-9263-C9ADE3A700B4}" srcOrd="0" destOrd="0" presId="urn:microsoft.com/office/officeart/2005/8/layout/cycle1"/>
+    <dgm:cxn modelId="{6C551B30-C7D7-8E4F-82FE-E97F0D50B480}" type="presOf" srcId="{89E53432-5284-43CA-B572-C3B27F28F77E}" destId="{76CD9CB2-754B-421B-9688-68159FF152A4}" srcOrd="0" destOrd="0" presId="urn:microsoft.com/office/officeart/2005/8/layout/cycle1"/>
     <dgm:cxn modelId="{B521523F-E8F8-4F6E-8025-B972CFB3920D}" srcId="{CF847011-5686-41A6-970B-836D6ABA1462}" destId="{9B59FFB9-4CA3-4655-9772-41EDD636DACE}" srcOrd="1" destOrd="0" parTransId="{2C7E8625-3FFB-4874-91E9-E03E716BED04}" sibTransId="{17DD5161-194B-4BFB-9A02-824349DEE786}"/>
-    <dgm:cxn modelId="{99C3CED5-42F0-4EDB-A90B-907166CB52A2}" srcId="{CF847011-5686-41A6-970B-836D6ABA1462}" destId="{1FD2EDB6-0792-4853-888D-F8E313EC0529}" srcOrd="0" destOrd="0" parTransId="{19F5EBA6-0280-45E8-AD49-03BF8E7E70EA}" sibTransId="{89E53432-5284-43CA-B572-C3B27F28F77E}"/>
-    <dgm:cxn modelId="{B02564AE-A930-CB44-A2DB-019C4B2ACBFD}" type="presOf" srcId="{9B59FFB9-4CA3-4655-9772-41EDD636DACE}" destId="{A6A33EE7-9D3A-4D21-AF97-D62855F60339}" srcOrd="0" destOrd="0" presId="urn:microsoft.com/office/officeart/2005/8/layout/cycle1"/>
+    <dgm:cxn modelId="{AAFCB048-76F9-47F3-970B-DB88B0CB155F}" srcId="{CF847011-5686-41A6-970B-836D6ABA1462}" destId="{32D904E7-4D91-4A2B-8282-A1723FBE0A42}" srcOrd="2" destOrd="0" parTransId="{19FD03D1-6527-4FBD-858B-1B74242BE78D}" sibTransId="{9FF7C395-D9D2-4EF3-9C38-83A96DE78305}"/>
+    <dgm:cxn modelId="{758B314C-9496-4B42-AAFA-F6055C733568}" type="presOf" srcId="{CF847011-5686-41A6-970B-836D6ABA1462}" destId="{09D1CFC4-FDD6-461A-8061-9CB412CCC1FB}" srcOrd="0" destOrd="0" presId="urn:microsoft.com/office/officeart/2005/8/layout/cycle1"/>
     <dgm:cxn modelId="{20873456-D202-45E1-B6C2-6D2A4C2E3FDF}" srcId="{CF847011-5686-41A6-970B-836D6ABA1462}" destId="{6CA7567A-9C21-49E3-A9B6-C6430031F8D4}" srcOrd="3" destOrd="0" parTransId="{5E24BF54-D336-4EF9-8C8B-5EDB6B11235C}" sibTransId="{B9D8FB78-52BA-4F13-AD97-614EA4179516}"/>
-    <dgm:cxn modelId="{03E4B62D-F988-504E-AE18-B43539CF3FDC}" type="presOf" srcId="{B9D8FB78-52BA-4F13-AD97-614EA4179516}" destId="{BA22C78F-9232-4DE9-9263-C9ADE3A700B4}" srcOrd="0" destOrd="0" presId="urn:microsoft.com/office/officeart/2005/8/layout/cycle1"/>
-    <dgm:cxn modelId="{36678EBA-95B7-CD42-8C67-80DFCD61BAB8}" type="presOf" srcId="{17DD5161-194B-4BFB-9A02-824349DEE786}" destId="{BD18207A-7BA1-40E1-92DB-54EE626FCB12}" srcOrd="0" destOrd="0" presId="urn:microsoft.com/office/officeart/2005/8/layout/cycle1"/>
-    <dgm:cxn modelId="{AAFCB048-76F9-47F3-970B-DB88B0CB155F}" srcId="{CF847011-5686-41A6-970B-836D6ABA1462}" destId="{32D904E7-4D91-4A2B-8282-A1723FBE0A42}" srcOrd="2" destOrd="0" parTransId="{19FD03D1-6527-4FBD-858B-1B74242BE78D}" sibTransId="{9FF7C395-D9D2-4EF3-9C38-83A96DE78305}"/>
     <dgm:cxn modelId="{4F928067-97EA-EE4B-A537-714E6546676B}" type="presOf" srcId="{9FF7C395-D9D2-4EF3-9C38-83A96DE78305}" destId="{6DC68B81-6986-465E-89D2-81C8B39EE67E}" srcOrd="0" destOrd="0" presId="urn:microsoft.com/office/officeart/2005/8/layout/cycle1"/>
     <dgm:cxn modelId="{1148679B-FCF8-254A-A89D-688525D8C6F6}" type="presOf" srcId="{6CA7567A-9C21-49E3-A9B6-C6430031F8D4}" destId="{D26AFAFE-910E-4E7B-89DD-386392FE19D3}" srcOrd="0" destOrd="0" presId="urn:microsoft.com/office/officeart/2005/8/layout/cycle1"/>
-    <dgm:cxn modelId="{758B314C-9496-4B42-AAFA-F6055C733568}" type="presOf" srcId="{CF847011-5686-41A6-970B-836D6ABA1462}" destId="{09D1CFC4-FDD6-461A-8061-9CB412CCC1FB}" srcOrd="0" destOrd="0" presId="urn:microsoft.com/office/officeart/2005/8/layout/cycle1"/>
-    <dgm:cxn modelId="{6C551B30-C7D7-8E4F-82FE-E97F0D50B480}" type="presOf" srcId="{89E53432-5284-43CA-B572-C3B27F28F77E}" destId="{76CD9CB2-754B-421B-9688-68159FF152A4}" srcOrd="0" destOrd="0" presId="urn:microsoft.com/office/officeart/2005/8/layout/cycle1"/>
-    <dgm:cxn modelId="{12D89A08-ED6D-0944-88E6-358492A8DFAC}" type="presOf" srcId="{32D904E7-4D91-4A2B-8282-A1723FBE0A42}" destId="{31678004-4357-4481-BC21-B504B0CE3C71}" srcOrd="0" destOrd="0" presId="urn:microsoft.com/office/officeart/2005/8/layout/cycle1"/>
+    <dgm:cxn modelId="{B02564AE-A930-CB44-A2DB-019C4B2ACBFD}" type="presOf" srcId="{9B59FFB9-4CA3-4655-9772-41EDD636DACE}" destId="{A6A33EE7-9D3A-4D21-AF97-D62855F60339}" srcOrd="0" destOrd="0" presId="urn:microsoft.com/office/officeart/2005/8/layout/cycle1"/>
+    <dgm:cxn modelId="{36678EBA-95B7-CD42-8C67-80DFCD61BAB8}" type="presOf" srcId="{17DD5161-194B-4BFB-9A02-824349DEE786}" destId="{BD18207A-7BA1-40E1-92DB-54EE626FCB12}" srcOrd="0" destOrd="0" presId="urn:microsoft.com/office/officeart/2005/8/layout/cycle1"/>
+    <dgm:cxn modelId="{99C3CED5-42F0-4EDB-A90B-907166CB52A2}" srcId="{CF847011-5686-41A6-970B-836D6ABA1462}" destId="{1FD2EDB6-0792-4853-888D-F8E313EC0529}" srcOrd="0" destOrd="0" parTransId="{19F5EBA6-0280-45E8-AD49-03BF8E7E70EA}" sibTransId="{89E53432-5284-43CA-B572-C3B27F28F77E}"/>
     <dgm:cxn modelId="{ED96BAEF-C97B-D042-AD29-8598D3EA173A}" type="presOf" srcId="{1FD2EDB6-0792-4853-888D-F8E313EC0529}" destId="{83120A9E-F6DC-45D9-96B6-483E12A69CE9}" srcOrd="0" destOrd="0" presId="urn:microsoft.com/office/officeart/2005/8/layout/cycle1"/>
     <dgm:cxn modelId="{505A82FC-835A-B642-AF4F-CB83F6D5900E}" type="presParOf" srcId="{09D1CFC4-FDD6-461A-8061-9CB412CCC1FB}" destId="{E0DE810A-379A-44CB-9416-569032F9EE21}" srcOrd="0" destOrd="0" presId="urn:microsoft.com/office/officeart/2005/8/layout/cycle1"/>
     <dgm:cxn modelId="{5000A194-1B76-BE4F-A6B2-83AE976231FF}" type="presParOf" srcId="{09D1CFC4-FDD6-461A-8061-9CB412CCC1FB}" destId="{83120A9E-F6DC-45D9-96B6-483E12A69CE9}" srcOrd="1" destOrd="0" presId="urn:microsoft.com/office/officeart/2005/8/layout/cycle1"/>
@@ -1327,7 +1264,7 @@
         </a:bodyPr>
         <a:lstStyle/>
         <a:p>
-          <a:pPr lvl="0" algn="ctr" defTabSz="577850">
+          <a:pPr marL="0" lvl="0" indent="0" algn="ctr" defTabSz="577850">
             <a:lnSpc>
               <a:spcPct val="90000"/>
             </a:lnSpc>
@@ -1337,6 +1274,7 @@
             <a:spcAft>
               <a:spcPct val="35000"/>
             </a:spcAft>
+            <a:buNone/>
           </a:pPr>
           <a:r>
             <a:rPr lang="de-DE" sz="1300" kern="1200" dirty="0"/>
@@ -1473,7 +1411,7 @@
         </a:bodyPr>
         <a:lstStyle/>
         <a:p>
-          <a:pPr lvl="0" algn="ctr" defTabSz="577850">
+          <a:pPr marL="0" lvl="0" indent="0" algn="ctr" defTabSz="577850">
             <a:lnSpc>
               <a:spcPct val="90000"/>
             </a:lnSpc>
@@ -1483,6 +1421,7 @@
             <a:spcAft>
               <a:spcPct val="35000"/>
             </a:spcAft>
+            <a:buNone/>
           </a:pPr>
           <a:r>
             <a:rPr lang="de-DE" sz="1300" kern="1200" dirty="0"/>
@@ -1619,7 +1558,7 @@
         </a:bodyPr>
         <a:lstStyle/>
         <a:p>
-          <a:pPr lvl="0" algn="ctr" defTabSz="577850">
+          <a:pPr marL="0" lvl="0" indent="0" algn="ctr" defTabSz="577850">
             <a:lnSpc>
               <a:spcPct val="90000"/>
             </a:lnSpc>
@@ -1629,6 +1568,7 @@
             <a:spcAft>
               <a:spcPct val="35000"/>
             </a:spcAft>
+            <a:buNone/>
           </a:pPr>
           <a:r>
             <a:rPr lang="de-DE" sz="1300" kern="1200" dirty="0"/>
@@ -1765,7 +1705,7 @@
         </a:bodyPr>
         <a:lstStyle/>
         <a:p>
-          <a:pPr lvl="0" algn="ctr" defTabSz="577850">
+          <a:pPr marL="0" lvl="0" indent="0" algn="ctr" defTabSz="577850">
             <a:lnSpc>
               <a:spcPct val="90000"/>
             </a:lnSpc>
@@ -1775,6 +1715,7 @@
             <a:spcAft>
               <a:spcPct val="35000"/>
             </a:spcAft>
+            <a:buNone/>
           </a:pPr>
           <a:r>
             <a:rPr lang="de-DE" sz="1300" kern="1200" dirty="0"/>
@@ -8092,10 +8033,6 @@
             <a:br>
               <a:rPr lang="de-DE" dirty="0"/>
             </a:br>
-            <a:r>
-              <a:rPr lang="de-DE" dirty="0"/>
-              <a:t/>
-            </a:r>
             <a:br>
               <a:rPr lang="de-DE" dirty="0"/>
             </a:br>
@@ -8167,10 +8104,6 @@
             <a:br>
               <a:rPr lang="de-DE" dirty="0"/>
             </a:br>
-            <a:r>
-              <a:rPr lang="de-DE" dirty="0"/>
-              <a:t/>
-            </a:r>
             <a:br>
               <a:rPr lang="de-DE" dirty="0"/>
             </a:br>
@@ -8388,10 +8321,6 @@
             <a:br>
               <a:rPr lang="de-DE" dirty="0"/>
             </a:br>
-            <a:r>
-              <a:rPr lang="de-DE" dirty="0"/>
-              <a:t/>
-            </a:r>
             <a:br>
               <a:rPr lang="de-DE" dirty="0"/>
             </a:br>
@@ -8463,10 +8392,6 @@
             <a:br>
               <a:rPr lang="de-DE" dirty="0"/>
             </a:br>
-            <a:r>
-              <a:rPr lang="de-DE" dirty="0"/>
-              <a:t/>
-            </a:r>
             <a:br>
               <a:rPr lang="de-DE" dirty="0"/>
             </a:br>
@@ -9104,38 +9029,18 @@
             <a:br>
               <a:rPr lang="de-DE" dirty="0"/>
             </a:br>
-            <a:r>
-              <a:rPr lang="de-DE" dirty="0"/>
-              <a:t/>
-            </a:r>
             <a:br>
               <a:rPr lang="de-DE" dirty="0"/>
             </a:br>
-            <a:r>
-              <a:rPr lang="de-DE" dirty="0"/>
-              <a:t/>
-            </a:r>
             <a:br>
               <a:rPr lang="de-DE" dirty="0"/>
             </a:br>
-            <a:r>
-              <a:rPr lang="de-DE" dirty="0"/>
-              <a:t/>
-            </a:r>
             <a:br>
               <a:rPr lang="de-DE" dirty="0"/>
             </a:br>
-            <a:r>
-              <a:rPr lang="de-DE" dirty="0"/>
-              <a:t/>
-            </a:r>
             <a:br>
               <a:rPr lang="de-DE" dirty="0"/>
             </a:br>
-            <a:r>
-              <a:rPr lang="de-DE" dirty="0"/>
-              <a:t/>
-            </a:r>
             <a:br>
               <a:rPr lang="de-DE" dirty="0"/>
             </a:br>
@@ -9981,10 +9886,9 @@
           <a:lstStyle/>
           <a:p>
             <a:r>
-              <a:rPr lang="de-DE" dirty="0" smtClean="0"/>
+              <a:rPr lang="de-DE" dirty="0"/>
               <a:t>Emotion Recognition</a:t>
             </a:r>
-            <a:endParaRPr lang="de-DE" dirty="0"/>
           </a:p>
         </p:txBody>
       </p:sp>
@@ -10004,26 +9908,25 @@
           <a:lstStyle/>
           <a:p>
             <a:r>
-              <a:rPr lang="de-DE" dirty="0" smtClean="0"/>
+              <a:rPr lang="de-DE" dirty="0"/>
               <a:t>P2 </a:t>
             </a:r>
             <a:r>
-              <a:rPr lang="mr-IN" dirty="0" smtClean="0"/>
+              <a:rPr lang="mr-IN" dirty="0"/>
               <a:t>–</a:t>
             </a:r>
             <a:r>
-              <a:rPr lang="de-DE" dirty="0" smtClean="0"/>
+              <a:rPr lang="de-DE" dirty="0"/>
               <a:t> </a:t>
             </a:r>
             <a:r>
-              <a:rPr lang="de-DE" dirty="0" err="1" smtClean="0"/>
+              <a:rPr lang="de-DE" dirty="0" err="1"/>
               <a:t>Deep</a:t>
             </a:r>
             <a:r>
-              <a:rPr lang="de-DE" dirty="0" smtClean="0"/>
+              <a:rPr lang="de-DE" dirty="0"/>
               <a:t> Learning Eye Catcher</a:t>
             </a:r>
-            <a:endParaRPr lang="de-DE" dirty="0"/>
           </a:p>
         </p:txBody>
       </p:sp>
@@ -10077,19 +9980,6 @@
               <a:buChar char="§"/>
             </a:pPr>
             <a:r>
-              <a:rPr lang="de-DE" spc="-1" dirty="0" smtClean="0">
-                <a:solidFill>
-                  <a:srgbClr val="000000"/>
-                </a:solidFill>
-                <a:uFill>
-                  <a:solidFill>
-                    <a:srgbClr val="FFFFFF"/>
-                  </a:solidFill>
-                </a:uFill>
-              </a:rPr>
-              <a:t>Bilder </a:t>
-            </a:r>
-            <a:r>
               <a:rPr lang="de-DE" spc="-1" dirty="0">
                 <a:solidFill>
                   <a:srgbClr val="000000"/>
@@ -10100,7 +9990,7 @@
                   </a:solidFill>
                 </a:uFill>
               </a:rPr>
-              <a:t>für NN werden aus dem Webcam-Stream gezogen</a:t>
+              <a:t>Bilder für NN werden aus dem Webcam-Stream gezogen</a:t>
             </a:r>
             <a:endParaRPr lang="de-DE" sz="1800" spc="-1" dirty="0">
               <a:solidFill>
@@ -10119,7 +10009,7 @@
               <a:buFont typeface="Wingdings" charset="2"/>
               <a:buChar char="§"/>
             </a:pPr>
-            <a:endParaRPr lang="de-DE" spc="-1" dirty="0" smtClean="0">
+            <a:endParaRPr lang="de-DE" spc="-1" dirty="0">
               <a:solidFill>
                 <a:srgbClr val="000000"/>
               </a:solidFill>
@@ -10135,19 +10025,6 @@
               <a:buFont typeface="Wingdings" charset="2"/>
               <a:buChar char="§"/>
             </a:pPr>
-            <a:r>
-              <a:rPr lang="de-DE" spc="-1" dirty="0" smtClean="0">
-                <a:solidFill>
-                  <a:srgbClr val="000000"/>
-                </a:solidFill>
-                <a:uFill>
-                  <a:solidFill>
-                    <a:srgbClr val="FFFFFF"/>
-                  </a:solidFill>
-                </a:uFill>
-              </a:rPr>
-              <a:t>jeweils </a:t>
-            </a:r>
             <a:r>
               <a:rPr lang="de-DE" spc="-1" dirty="0">
                 <a:solidFill>
@@ -10159,7 +10036,7 @@
                   </a:solidFill>
                 </a:uFill>
               </a:rPr>
-              <a:t>5 Bilder werden pro Vergleich abgespeichert</a:t>
+              <a:t>jeweils 5 Bilder werden pro Vergleich abgespeichert</a:t>
             </a:r>
             <a:endParaRPr lang="de-DE" sz="1800" spc="-1" dirty="0">
               <a:solidFill>
@@ -10196,19 +10073,6 @@
               <a:buChar char="§"/>
             </a:pPr>
             <a:r>
-              <a:rPr lang="de-DE" spc="-1" dirty="0" smtClean="0">
-                <a:solidFill>
-                  <a:srgbClr val="000000"/>
-                </a:solidFill>
-                <a:uFill>
-                  <a:solidFill>
-                    <a:srgbClr val="FFFFFF"/>
-                  </a:solidFill>
-                </a:uFill>
-              </a:rPr>
-              <a:t>abgespeicherte </a:t>
-            </a:r>
-            <a:r>
               <a:rPr lang="de-DE" spc="-1" dirty="0">
                 <a:solidFill>
                   <a:srgbClr val="000000"/>
@@ -10219,7 +10083,7 @@
                   </a:solidFill>
                 </a:uFill>
               </a:rPr>
-              <a:t>Bilder werden bei neuem Vergleich durch neue </a:t>
+              <a:t>abgespeicherte Bilder werden bei neuem Vergleich durch neue </a:t>
             </a:r>
             <a:r>
               <a:rPr lang="de-DE" spc="-1" dirty="0" err="1">
@@ -10280,10 +10144,9 @@
           <a:lstStyle/>
           <a:p>
             <a:r>
-              <a:rPr lang="de-DE" dirty="0" smtClean="0"/>
+              <a:rPr lang="de-DE" dirty="0"/>
               <a:t>Webcam</a:t>
             </a:r>
-            <a:endParaRPr lang="de-DE" dirty="0"/>
           </a:p>
         </p:txBody>
       </p:sp>
@@ -10849,7 +10712,6 @@
               <a:rPr lang="de-DE" sz="1200" dirty="0"/>
               <a:t> aufrufen</a:t>
             </a:r>
-            <a:endParaRPr lang="de-DE" sz="1200" dirty="0"/>
           </a:p>
         </p:txBody>
       </p:sp>
@@ -10920,14 +10782,6 @@
                 </a:rPr>
                 <a:t>Python Prozess</a:t>
               </a:r>
-              <a:endParaRPr lang="de-DE" sz="1200" dirty="0">
-                <a:solidFill>
-                  <a:schemeClr val="tx1">
-                    <a:lumMod val="75000"/>
-                    <a:lumOff val="25000"/>
-                  </a:schemeClr>
-                </a:solidFill>
-              </a:endParaRPr>
             </a:p>
           </p:txBody>
         </p:sp>
@@ -11402,11 +11256,6 @@
               </a:rPr>
               <a:t>befüllen</a:t>
             </a:r>
-            <a:endParaRPr lang="de-DE" sz="1050" dirty="0">
-              <a:solidFill>
-                <a:schemeClr val="bg1"/>
-              </a:solidFill>
-            </a:endParaRPr>
           </a:p>
         </p:txBody>
       </p:sp>
@@ -11467,7 +11316,6 @@
               <a:rPr lang="de-DE" sz="2100" dirty="0"/>
               <a:t>NN</a:t>
             </a:r>
-            <a:endParaRPr lang="de-DE" sz="2100" dirty="0"/>
           </a:p>
         </p:txBody>
       </p:sp>
@@ -11710,7 +11558,6 @@
               <a:rPr lang="de-DE" sz="1200" dirty="0"/>
               <a:t>Ordner leeren</a:t>
             </a:r>
-            <a:endParaRPr lang="de-DE" sz="1200" dirty="0"/>
           </a:p>
         </p:txBody>
       </p:sp>
@@ -11724,13 +11571,6 @@
   <p:clrMapOvr>
     <a:masterClrMapping/>
   </p:clrMapOvr>
-  <p:timing>
-    <p:tnLst>
-      <p:par>
-        <p:cTn id="1" dur="indefinite" restart="never" nodeType="tmRoot"/>
-      </p:par>
-    </p:tnLst>
-  </p:timing>
 </p:sld>
 </file>
 
@@ -11756,7 +11596,7 @@
           <p:cNvPr id="3" name="Textplatzhalter 2">
             <a:extLst>
               <a:ext uri="{FF2B5EF4-FFF2-40B4-BE49-F238E27FC236}">
-                <a16:creationId xmlns:a16="http://schemas.microsoft.com/office/drawing/2014/main" xmlns="" id="{73620D6E-35E0-45A5-9F86-E13C6BCC9A63}"/>
+                <a16:creationId xmlns:a16="http://schemas.microsoft.com/office/drawing/2014/main" id="{73620D6E-35E0-45A5-9F86-E13C6BCC9A63}"/>
               </a:ext>
             </a:extLst>
           </p:cNvPr>
@@ -11820,10 +11660,6 @@
               <a:rPr lang="de-DE" dirty="0" err="1"/>
               <a:t>dataset</a:t>
             </a:r>
-            <a:r>
-              <a:rPr lang="de-DE" dirty="0"/>
-              <a:t/>
-            </a:r>
             <a:br>
               <a:rPr lang="de-DE" dirty="0"/>
             </a:br>
@@ -11856,10 +11692,6 @@
             <a:r>
               <a:rPr lang="de-DE" dirty="0"/>
               <a:t>Bewerten der Genauigkeit des Models</a:t>
-            </a:r>
-            <a:r>
-              <a:rPr lang="en-US" dirty="0"/>
-              <a:t/>
             </a:r>
             <a:br>
               <a:rPr lang="en-US" dirty="0"/>
@@ -11903,10 +11735,6 @@
               <a:rPr lang="de-DE" dirty="0" err="1"/>
               <a:t>NumPy</a:t>
             </a:r>
-            <a:r>
-              <a:rPr lang="de-DE" dirty="0"/>
-              <a:t/>
-            </a:r>
             <a:br>
               <a:rPr lang="de-DE" dirty="0"/>
             </a:br>
@@ -11954,10 +11782,6 @@
             <a:br>
               <a:rPr lang="de-DE" dirty="0"/>
             </a:br>
-            <a:r>
-              <a:rPr lang="de-DE" dirty="0"/>
-              <a:t/>
-            </a:r>
             <a:br>
               <a:rPr lang="de-DE" dirty="0"/>
             </a:br>
@@ -11968,10 +11792,6 @@
             <a:r>
               <a:rPr lang="de-DE" dirty="0" err="1"/>
               <a:t>anger</a:t>
-            </a:r>
-            <a:r>
-              <a:rPr lang="de-DE" dirty="0"/>
-              <a:t/>
             </a:r>
             <a:br>
               <a:rPr lang="de-DE" dirty="0"/>
@@ -12011,10 +11831,6 @@
             <a:r>
               <a:rPr lang="de-DE" dirty="0" err="1"/>
               <a:t>surprise</a:t>
-            </a:r>
-            <a:r>
-              <a:rPr lang="de-DE" dirty="0"/>
-              <a:t/>
             </a:r>
             <a:br>
               <a:rPr lang="de-DE" dirty="0"/>
@@ -12037,7 +11853,7 @@
           <p:cNvPr id="5" name="Textplatzhalter 4">
             <a:extLst>
               <a:ext uri="{FF2B5EF4-FFF2-40B4-BE49-F238E27FC236}">
-                <a16:creationId xmlns:a16="http://schemas.microsoft.com/office/drawing/2014/main" xmlns="" id="{FC3CFBC5-FB50-4C91-A32D-24669CAB1371}"/>
+                <a16:creationId xmlns:a16="http://schemas.microsoft.com/office/drawing/2014/main" id="{FC3CFBC5-FB50-4C91-A32D-24669CAB1371}"/>
               </a:ext>
             </a:extLst>
           </p:cNvPr>
@@ -12065,7 +11881,7 @@
           <p:cNvPr id="7" name="Inhaltsplatzhalter 4">
             <a:extLst>
               <a:ext uri="{FF2B5EF4-FFF2-40B4-BE49-F238E27FC236}">
-                <a16:creationId xmlns:a16="http://schemas.microsoft.com/office/drawing/2014/main" xmlns="" id="{1E0AB189-119E-4E88-AE63-98D17629085F}"/>
+                <a16:creationId xmlns:a16="http://schemas.microsoft.com/office/drawing/2014/main" id="{1E0AB189-119E-4E88-AE63-98D17629085F}"/>
               </a:ext>
             </a:extLst>
           </p:cNvPr>
@@ -12098,7 +11914,7 @@
           <p:cNvPr id="12" name="Grafik 11">
             <a:extLst>
               <a:ext uri="{FF2B5EF4-FFF2-40B4-BE49-F238E27FC236}">
-                <a16:creationId xmlns:a16="http://schemas.microsoft.com/office/drawing/2014/main" xmlns="" id="{A05DEDC5-B423-4C5B-9DCE-4B16A5A11619}"/>
+                <a16:creationId xmlns:a16="http://schemas.microsoft.com/office/drawing/2014/main" id="{A05DEDC5-B423-4C5B-9DCE-4B16A5A11619}"/>
               </a:ext>
             </a:extLst>
           </p:cNvPr>
@@ -12164,7 +11980,7 @@
           <p:cNvPr id="6" name="Textplatzhalter 5">
             <a:extLst>
               <a:ext uri="{FF2B5EF4-FFF2-40B4-BE49-F238E27FC236}">
-                <a16:creationId xmlns:a16="http://schemas.microsoft.com/office/drawing/2014/main" xmlns="" id="{322AD5D4-1293-C347-9DBD-4CB94FD04DBA}"/>
+                <a16:creationId xmlns:a16="http://schemas.microsoft.com/office/drawing/2014/main" id="{322AD5D4-1293-C347-9DBD-4CB94FD04DBA}"/>
               </a:ext>
             </a:extLst>
           </p:cNvPr>
@@ -12196,7 +12012,7 @@
           <p:cNvPr id="7" name="Titel 6">
             <a:extLst>
               <a:ext uri="{FF2B5EF4-FFF2-40B4-BE49-F238E27FC236}">
-                <a16:creationId xmlns:a16="http://schemas.microsoft.com/office/drawing/2014/main" xmlns="" id="{3444E9F3-2B09-3246-B248-DB36EB14F46D}"/>
+                <a16:creationId xmlns:a16="http://schemas.microsoft.com/office/drawing/2014/main" id="{3444E9F3-2B09-3246-B248-DB36EB14F46D}"/>
               </a:ext>
             </a:extLst>
           </p:cNvPr>
@@ -12212,10 +12028,7 @@
           <a:bodyPr/>
           <a:lstStyle/>
           <a:p>
-            <a:r>
-              <a:rPr lang="de-DE" dirty="0"/>
-              <a:t>NN</a:t>
-            </a:r>
+            <a:endParaRPr lang="de-DE" dirty="0"/>
           </a:p>
         </p:txBody>
       </p:sp>
@@ -12224,7 +12037,7 @@
           <p:cNvPr id="12" name="Textfeld 11">
             <a:extLst>
               <a:ext uri="{FF2B5EF4-FFF2-40B4-BE49-F238E27FC236}">
-                <a16:creationId xmlns:a16="http://schemas.microsoft.com/office/drawing/2014/main" xmlns="" id="{BE96A17C-FAC2-4E48-A01F-A8C39DD6C9DE}"/>
+                <a16:creationId xmlns:a16="http://schemas.microsoft.com/office/drawing/2014/main" id="{BE96A17C-FAC2-4E48-A01F-A8C39DD6C9DE}"/>
               </a:ext>
             </a:extLst>
           </p:cNvPr>
@@ -12256,7 +12069,7 @@
           <p:cNvPr id="16" name="Rechteck 15">
             <a:extLst>
               <a:ext uri="{FF2B5EF4-FFF2-40B4-BE49-F238E27FC236}">
-                <a16:creationId xmlns:a16="http://schemas.microsoft.com/office/drawing/2014/main" xmlns="" id="{0A05A358-D871-5843-BA6C-3BC368267882}"/>
+                <a16:creationId xmlns:a16="http://schemas.microsoft.com/office/drawing/2014/main" id="{0A05A358-D871-5843-BA6C-3BC368267882}"/>
               </a:ext>
             </a:extLst>
           </p:cNvPr>
@@ -12637,7 +12450,7 @@
           <p:cNvPr id="18" name="Textfeld 17">
             <a:extLst>
               <a:ext uri="{FF2B5EF4-FFF2-40B4-BE49-F238E27FC236}">
-                <a16:creationId xmlns:a16="http://schemas.microsoft.com/office/drawing/2014/main" xmlns="" id="{F3AA1672-55A0-3841-8490-CB339F94EC14}"/>
+                <a16:creationId xmlns:a16="http://schemas.microsoft.com/office/drawing/2014/main" id="{F3AA1672-55A0-3841-8490-CB339F94EC14}"/>
               </a:ext>
             </a:extLst>
           </p:cNvPr>
@@ -12818,7 +12631,7 @@
           <p:cNvPr id="6" name="Textplatzhalter 5">
             <a:extLst>
               <a:ext uri="{FF2B5EF4-FFF2-40B4-BE49-F238E27FC236}">
-                <a16:creationId xmlns:a16="http://schemas.microsoft.com/office/drawing/2014/main" xmlns="" id="{322AD5D4-1293-C347-9DBD-4CB94FD04DBA}"/>
+                <a16:creationId xmlns:a16="http://schemas.microsoft.com/office/drawing/2014/main" id="{322AD5D4-1293-C347-9DBD-4CB94FD04DBA}"/>
               </a:ext>
             </a:extLst>
           </p:cNvPr>
@@ -12852,7 +12665,7 @@
           <p:cNvPr id="7" name="Titel 6">
             <a:extLst>
               <a:ext uri="{FF2B5EF4-FFF2-40B4-BE49-F238E27FC236}">
-                <a16:creationId xmlns:a16="http://schemas.microsoft.com/office/drawing/2014/main" xmlns="" id="{3444E9F3-2B09-3246-B248-DB36EB14F46D}"/>
+                <a16:creationId xmlns:a16="http://schemas.microsoft.com/office/drawing/2014/main" id="{3444E9F3-2B09-3246-B248-DB36EB14F46D}"/>
               </a:ext>
             </a:extLst>
           </p:cNvPr>
@@ -12868,10 +12681,7 @@
           <a:bodyPr/>
           <a:lstStyle/>
           <a:p>
-            <a:r>
-              <a:rPr lang="de-DE" dirty="0"/>
-              <a:t>NN</a:t>
-            </a:r>
+            <a:endParaRPr lang="de-DE" dirty="0"/>
           </a:p>
         </p:txBody>
       </p:sp>
@@ -12880,7 +12690,7 @@
           <p:cNvPr id="11" name="Textfeld 10">
             <a:extLst>
               <a:ext uri="{FF2B5EF4-FFF2-40B4-BE49-F238E27FC236}">
-                <a16:creationId xmlns:a16="http://schemas.microsoft.com/office/drawing/2014/main" xmlns="" id="{41D80CE3-5D58-2442-BCC6-6EF6CC9954E2}"/>
+                <a16:creationId xmlns:a16="http://schemas.microsoft.com/office/drawing/2014/main" id="{41D80CE3-5D58-2442-BCC6-6EF6CC9954E2}"/>
               </a:ext>
             </a:extLst>
           </p:cNvPr>
@@ -13023,7 +12833,7 @@
           <p:cNvPr id="12" name="Textfeld 11">
             <a:extLst>
               <a:ext uri="{FF2B5EF4-FFF2-40B4-BE49-F238E27FC236}">
-                <a16:creationId xmlns:a16="http://schemas.microsoft.com/office/drawing/2014/main" xmlns="" id="{BE96A17C-FAC2-4E48-A01F-A8C39DD6C9DE}"/>
+                <a16:creationId xmlns:a16="http://schemas.microsoft.com/office/drawing/2014/main" id="{BE96A17C-FAC2-4E48-A01F-A8C39DD6C9DE}"/>
               </a:ext>
             </a:extLst>
           </p:cNvPr>
@@ -13055,7 +12865,7 @@
           <p:cNvPr id="10" name="Rechteck 9">
             <a:extLst>
               <a:ext uri="{FF2B5EF4-FFF2-40B4-BE49-F238E27FC236}">
-                <a16:creationId xmlns:a16="http://schemas.microsoft.com/office/drawing/2014/main" xmlns="" id="{1E642548-5D9B-904E-9ABD-FAB57010B7C0}"/>
+                <a16:creationId xmlns:a16="http://schemas.microsoft.com/office/drawing/2014/main" id="{1E642548-5D9B-904E-9ABD-FAB57010B7C0}"/>
               </a:ext>
             </a:extLst>
           </p:cNvPr>
@@ -13439,7 +13249,7 @@
           <p:cNvPr id="5" name="Textfeld 4">
             <a:extLst>
               <a:ext uri="{FF2B5EF4-FFF2-40B4-BE49-F238E27FC236}">
-                <a16:creationId xmlns:a16="http://schemas.microsoft.com/office/drawing/2014/main" xmlns="" id="{8EE22503-52FF-374C-BBBD-3AAFB0E9D001}"/>
+                <a16:creationId xmlns:a16="http://schemas.microsoft.com/office/drawing/2014/main" id="{8EE22503-52FF-374C-BBBD-3AAFB0E9D001}"/>
               </a:ext>
             </a:extLst>
           </p:cNvPr>
@@ -13480,7 +13290,7 @@
           <p:cNvPr id="8" name="Textfeld 7">
             <a:extLst>
               <a:ext uri="{FF2B5EF4-FFF2-40B4-BE49-F238E27FC236}">
-                <a16:creationId xmlns:a16="http://schemas.microsoft.com/office/drawing/2014/main" xmlns="" id="{A44180C0-DCE5-234D-9C80-DAD421C88080}"/>
+                <a16:creationId xmlns:a16="http://schemas.microsoft.com/office/drawing/2014/main" id="{A44180C0-DCE5-234D-9C80-DAD421C88080}"/>
               </a:ext>
             </a:extLst>
           </p:cNvPr>
@@ -13578,10 +13388,7 @@
           <a:bodyPr/>
           <a:lstStyle/>
           <a:p>
-            <a:r>
-              <a:rPr lang="de-DE" dirty="0"/>
-              <a:t>NN</a:t>
-            </a:r>
+            <a:endParaRPr lang="de-DE" dirty="0"/>
           </a:p>
         </p:txBody>
       </p:sp>
@@ -13590,7 +13397,7 @@
           <p:cNvPr id="10" name="Textfeld 9">
             <a:extLst>
               <a:ext uri="{FF2B5EF4-FFF2-40B4-BE49-F238E27FC236}">
-                <a16:creationId xmlns:a16="http://schemas.microsoft.com/office/drawing/2014/main" xmlns="" id="{BB16E20A-EC03-8D44-AD92-C9ECC1EF581D}"/>
+                <a16:creationId xmlns:a16="http://schemas.microsoft.com/office/drawing/2014/main" id="{BB16E20A-EC03-8D44-AD92-C9ECC1EF581D}"/>
               </a:ext>
             </a:extLst>
           </p:cNvPr>
@@ -13676,7 +13483,7 @@
           <p:cNvPr id="11" name="Textfeld 10">
             <a:extLst>
               <a:ext uri="{FF2B5EF4-FFF2-40B4-BE49-F238E27FC236}">
-                <a16:creationId xmlns:a16="http://schemas.microsoft.com/office/drawing/2014/main" xmlns="" id="{FDCEA745-D6A3-534C-BF74-ED01EF1AC658}"/>
+                <a16:creationId xmlns:a16="http://schemas.microsoft.com/office/drawing/2014/main" id="{FDCEA745-D6A3-534C-BF74-ED01EF1AC658}"/>
               </a:ext>
             </a:extLst>
           </p:cNvPr>
@@ -13854,14 +13661,13 @@
           <a:lstStyle/>
           <a:p>
             <a:r>
-              <a:rPr lang="de-DE" dirty="0" err="1" smtClean="0"/>
+              <a:rPr lang="de-DE" dirty="0" err="1"/>
               <a:t>Deep</a:t>
             </a:r>
             <a:r>
-              <a:rPr lang="de-DE" dirty="0" smtClean="0"/>
+              <a:rPr lang="de-DE" dirty="0"/>
               <a:t> Learning</a:t>
             </a:r>
-            <a:endParaRPr lang="de-DE" dirty="0"/>
           </a:p>
         </p:txBody>
       </p:sp>
@@ -14332,10 +14138,9 @@
           <a:lstStyle/>
           <a:p>
             <a:r>
-              <a:rPr lang="de-DE" dirty="0" smtClean="0"/>
+              <a:rPr lang="de-DE" dirty="0"/>
               <a:t>Input</a:t>
             </a:r>
-            <a:endParaRPr lang="de-DE" dirty="0"/>
           </a:p>
         </p:txBody>
       </p:sp>
@@ -15425,7 +15230,7 @@
           <a:lstStyle/>
           <a:p>
             <a:r>
-              <a:rPr lang="de-DE" smtClean="0"/>
+              <a:rPr lang="de-DE"/>
               <a:t>Hidden </a:t>
             </a:r>
             <a:r>
@@ -15433,7 +15238,7 @@
               <a:t>L</a:t>
             </a:r>
             <a:r>
-              <a:rPr lang="de-DE" smtClean="0"/>
+              <a:rPr lang="de-DE"/>
               <a:t>ayer</a:t>
             </a:r>
             <a:endParaRPr lang="de-DE" dirty="0"/>
@@ -15463,7 +15268,7 @@
           <a:lstStyle/>
           <a:p>
             <a:r>
-              <a:rPr lang="de-DE" smtClean="0"/>
+              <a:rPr lang="de-DE"/>
               <a:t>Hidden </a:t>
             </a:r>
             <a:r>
@@ -15471,7 +15276,7 @@
               <a:t>L</a:t>
             </a:r>
             <a:r>
-              <a:rPr lang="de-DE" smtClean="0"/>
+              <a:rPr lang="de-DE"/>
               <a:t>ayer</a:t>
             </a:r>
             <a:endParaRPr lang="de-DE" dirty="0"/>
@@ -15574,13 +15379,8 @@
           <a:p>
             <a:r>
               <a:rPr lang="de-DE" dirty="0"/>
-              <a:t>O</a:t>
-            </a:r>
-            <a:r>
-              <a:rPr lang="de-DE" dirty="0" smtClean="0"/>
-              <a:t>utput</a:t>
-            </a:r>
-            <a:endParaRPr lang="de-DE" dirty="0"/>
+              <a:t>Output</a:t>
+            </a:r>
           </a:p>
         </p:txBody>
       </p:sp>
@@ -15691,7 +15491,7 @@
           <p:cNvPr id="7" name="Titel 6">
             <a:extLst>
               <a:ext uri="{FF2B5EF4-FFF2-40B4-BE49-F238E27FC236}">
-                <a16:creationId xmlns:a16="http://schemas.microsoft.com/office/drawing/2014/main" xmlns="" id="{3444E9F3-2B09-3246-B248-DB36EB14F46D}"/>
+                <a16:creationId xmlns:a16="http://schemas.microsoft.com/office/drawing/2014/main" id="{3444E9F3-2B09-3246-B248-DB36EB14F46D}"/>
               </a:ext>
             </a:extLst>
           </p:cNvPr>
@@ -15707,12 +15507,8 @@
           <a:bodyPr/>
           <a:lstStyle/>
           <a:p>
-            <a:r>
-              <a:rPr lang="de-DE" dirty="0" smtClean="0"/>
-              <a:t/>
-            </a:r>
             <a:br>
-              <a:rPr lang="de-DE" dirty="0" smtClean="0"/>
+              <a:rPr lang="de-DE" dirty="0"/>
             </a:br>
             <a:endParaRPr lang="de-DE" dirty="0"/>
           </a:p>
@@ -15723,7 +15519,7 @@
           <p:cNvPr id="12" name="Textfeld 11">
             <a:extLst>
               <a:ext uri="{FF2B5EF4-FFF2-40B4-BE49-F238E27FC236}">
-                <a16:creationId xmlns:a16="http://schemas.microsoft.com/office/drawing/2014/main" xmlns="" id="{BE96A17C-FAC2-4E48-A01F-A8C39DD6C9DE}"/>
+                <a16:creationId xmlns:a16="http://schemas.microsoft.com/office/drawing/2014/main" id="{BE96A17C-FAC2-4E48-A01F-A8C39DD6C9DE}"/>
               </a:ext>
             </a:extLst>
           </p:cNvPr>
@@ -15766,10 +15562,9 @@
           <a:lstStyle/>
           <a:p>
             <a:r>
-              <a:rPr lang="de-DE" dirty="0" smtClean="0"/>
+              <a:rPr lang="de-DE" dirty="0"/>
               <a:t>Emotionserkennung in 3 Schritten:</a:t>
             </a:r>
-            <a:endParaRPr lang="de-DE" dirty="0"/>
           </a:p>
         </p:txBody>
       </p:sp>
@@ -15796,7 +15591,7 @@
           <a:lstStyle/>
           <a:p>
             <a:r>
-              <a:rPr lang="de-DE" sz="2000" dirty="0" smtClean="0"/>
+              <a:rPr lang="de-DE" sz="2000" dirty="0"/>
               <a:t>1. Gesichtsdetektion</a:t>
             </a:r>
           </a:p>
@@ -15804,11 +15599,11 @@
             <a:endParaRPr lang="de-DE" sz="2000" dirty="0"/>
           </a:p>
           <a:p>
-            <a:endParaRPr lang="de-DE" sz="2000" dirty="0" smtClean="0"/>
-          </a:p>
-          <a:p>
-            <a:r>
-              <a:rPr lang="de-DE" sz="2000" dirty="0" smtClean="0"/>
+            <a:endParaRPr lang="de-DE" sz="2000" dirty="0"/>
+          </a:p>
+          <a:p>
+            <a:r>
+              <a:rPr lang="de-DE" sz="2000" dirty="0"/>
               <a:t>2. Merkmal Extrahierung</a:t>
             </a:r>
           </a:p>
@@ -15816,14 +15611,13 @@
             <a:endParaRPr lang="de-DE" sz="2000" dirty="0"/>
           </a:p>
           <a:p>
-            <a:endParaRPr lang="de-DE" sz="2000" dirty="0" smtClean="0"/>
-          </a:p>
-          <a:p>
-            <a:r>
-              <a:rPr lang="de-DE" sz="2000" dirty="0" smtClean="0"/>
+            <a:endParaRPr lang="de-DE" sz="2000" dirty="0"/>
+          </a:p>
+          <a:p>
+            <a:r>
+              <a:rPr lang="de-DE" sz="2000" dirty="0"/>
               <a:t>3. Klassifizierung</a:t>
             </a:r>
-            <a:endParaRPr lang="de-DE" sz="2000" dirty="0"/>
           </a:p>
         </p:txBody>
       </p:sp>
@@ -15862,7 +15656,7 @@
           <p:cNvPr id="3" name="TextBox 2">
             <a:extLst>
               <a:ext uri="{FF2B5EF4-FFF2-40B4-BE49-F238E27FC236}">
-                <a16:creationId xmlns:a16="http://schemas.microsoft.com/office/drawing/2014/main" xmlns="" id="{E7EE3C88-EC57-4806-ABB2-42DDAAEB788F}"/>
+                <a16:creationId xmlns:a16="http://schemas.microsoft.com/office/drawing/2014/main" id="{E7EE3C88-EC57-4806-ABB2-42DDAAEB788F}"/>
               </a:ext>
             </a:extLst>
           </p:cNvPr>
@@ -15906,7 +15700,7 @@
           <p:cNvPr id="5" name="Picture 4" descr="A screenshot of a video game&#10;&#10;Description automatically generated">
             <a:extLst>
               <a:ext uri="{FF2B5EF4-FFF2-40B4-BE49-F238E27FC236}">
-                <a16:creationId xmlns:a16="http://schemas.microsoft.com/office/drawing/2014/main" xmlns="" id="{FBF7305B-A066-48BA-9DD6-54F21078918C}"/>
+                <a16:creationId xmlns:a16="http://schemas.microsoft.com/office/drawing/2014/main" id="{FBF7305B-A066-48BA-9DD6-54F21078918C}"/>
               </a:ext>
             </a:extLst>
           </p:cNvPr>
@@ -15971,7 +15765,7 @@
           <p:cNvPr id="7" name="Picture 6" descr="A screenshot of a cell phone&#10;&#10;Description automatically generated">
             <a:extLst>
               <a:ext uri="{FF2B5EF4-FFF2-40B4-BE49-F238E27FC236}">
-                <a16:creationId xmlns:a16="http://schemas.microsoft.com/office/drawing/2014/main" xmlns="" id="{0762EA95-833B-4D3E-B858-19CA0B287D28}"/>
+                <a16:creationId xmlns:a16="http://schemas.microsoft.com/office/drawing/2014/main" id="{0762EA95-833B-4D3E-B858-19CA0B287D28}"/>
               </a:ext>
             </a:extLst>
           </p:cNvPr>
@@ -16007,7 +15801,7 @@
           <p:cNvPr id="8" name="TextBox 7">
             <a:extLst>
               <a:ext uri="{FF2B5EF4-FFF2-40B4-BE49-F238E27FC236}">
-                <a16:creationId xmlns:a16="http://schemas.microsoft.com/office/drawing/2014/main" xmlns="" id="{DD08EF3E-D050-4148-B5C9-52421684CF49}"/>
+                <a16:creationId xmlns:a16="http://schemas.microsoft.com/office/drawing/2014/main" id="{DD08EF3E-D050-4148-B5C9-52421684CF49}"/>
               </a:ext>
             </a:extLst>
           </p:cNvPr>
@@ -16043,7 +15837,7 @@
           <p:cNvPr id="10" name="Straight Arrow Connector 9">
             <a:extLst>
               <a:ext uri="{FF2B5EF4-FFF2-40B4-BE49-F238E27FC236}">
-                <a16:creationId xmlns:a16="http://schemas.microsoft.com/office/drawing/2014/main" xmlns="" id="{C68FAE88-8BB1-43CD-93A4-2CC9A5C2687A}"/>
+                <a16:creationId xmlns:a16="http://schemas.microsoft.com/office/drawing/2014/main" id="{C68FAE88-8BB1-43CD-93A4-2CC9A5C2687A}"/>
               </a:ext>
             </a:extLst>
           </p:cNvPr>
@@ -16082,7 +15876,7 @@
           <p:cNvPr id="11" name="Straight Arrow Connector 10">
             <a:extLst>
               <a:ext uri="{FF2B5EF4-FFF2-40B4-BE49-F238E27FC236}">
-                <a16:creationId xmlns:a16="http://schemas.microsoft.com/office/drawing/2014/main" xmlns="" id="{F35E6A3B-3352-4503-BC65-A12DC1E18017}"/>
+                <a16:creationId xmlns:a16="http://schemas.microsoft.com/office/drawing/2014/main" id="{F35E6A3B-3352-4503-BC65-A12DC1E18017}"/>
               </a:ext>
             </a:extLst>
           </p:cNvPr>
@@ -16123,7 +15917,7 @@
           <p:cNvPr id="13" name="Straight Arrow Connector 12">
             <a:extLst>
               <a:ext uri="{FF2B5EF4-FFF2-40B4-BE49-F238E27FC236}">
-                <a16:creationId xmlns:a16="http://schemas.microsoft.com/office/drawing/2014/main" xmlns="" id="{131AF881-57B5-4C17-BB65-7026F62FB20B}"/>
+                <a16:creationId xmlns:a16="http://schemas.microsoft.com/office/drawing/2014/main" id="{131AF881-57B5-4C17-BB65-7026F62FB20B}"/>
               </a:ext>
             </a:extLst>
           </p:cNvPr>
@@ -16164,7 +15958,7 @@
           <p:cNvPr id="14" name="TextBox 13">
             <a:extLst>
               <a:ext uri="{FF2B5EF4-FFF2-40B4-BE49-F238E27FC236}">
-                <a16:creationId xmlns:a16="http://schemas.microsoft.com/office/drawing/2014/main" xmlns="" id="{25851474-75AF-4B5B-AE17-2AE42D7F4494}"/>
+                <a16:creationId xmlns:a16="http://schemas.microsoft.com/office/drawing/2014/main" id="{25851474-75AF-4B5B-AE17-2AE42D7F4494}"/>
               </a:ext>
             </a:extLst>
           </p:cNvPr>
@@ -16200,7 +15994,7 @@
           <p:cNvPr id="15" name="TextBox 14">
             <a:extLst>
               <a:ext uri="{FF2B5EF4-FFF2-40B4-BE49-F238E27FC236}">
-                <a16:creationId xmlns:a16="http://schemas.microsoft.com/office/drawing/2014/main" xmlns="" id="{3D70A1A8-F8C4-4ECC-BCE7-6900365CB396}"/>
+                <a16:creationId xmlns:a16="http://schemas.microsoft.com/office/drawing/2014/main" id="{3D70A1A8-F8C4-4ECC-BCE7-6900365CB396}"/>
               </a:ext>
             </a:extLst>
           </p:cNvPr>
@@ -16236,7 +16030,7 @@
           <p:cNvPr id="16" name="TextBox 15">
             <a:extLst>
               <a:ext uri="{FF2B5EF4-FFF2-40B4-BE49-F238E27FC236}">
-                <a16:creationId xmlns:a16="http://schemas.microsoft.com/office/drawing/2014/main" xmlns="" id="{D22A9151-6A89-410A-8407-5036638065AF}"/>
+                <a16:creationId xmlns:a16="http://schemas.microsoft.com/office/drawing/2014/main" id="{D22A9151-6A89-410A-8407-5036638065AF}"/>
               </a:ext>
             </a:extLst>
           </p:cNvPr>
@@ -16272,7 +16066,7 @@
           <p:cNvPr id="26" name="Picture 25" descr="A picture containing red, indoor, sitting, black&#10;&#10;Description automatically generated">
             <a:extLst>
               <a:ext uri="{FF2B5EF4-FFF2-40B4-BE49-F238E27FC236}">
-                <a16:creationId xmlns:a16="http://schemas.microsoft.com/office/drawing/2014/main" xmlns="" id="{98BD046A-3A1B-429E-B61C-E9D9ABD57838}"/>
+                <a16:creationId xmlns:a16="http://schemas.microsoft.com/office/drawing/2014/main" id="{98BD046A-3A1B-429E-B61C-E9D9ABD57838}"/>
               </a:ext>
             </a:extLst>
           </p:cNvPr>
@@ -16308,7 +16102,7 @@
           <p:cNvPr id="28" name="Picture 27" descr="A picture containing map, text&#10;&#10;Description automatically generated">
             <a:extLst>
               <a:ext uri="{FF2B5EF4-FFF2-40B4-BE49-F238E27FC236}">
-                <a16:creationId xmlns:a16="http://schemas.microsoft.com/office/drawing/2014/main" xmlns="" id="{75925000-9F7D-46E8-B6D4-D6BED8C0ECE5}"/>
+                <a16:creationId xmlns:a16="http://schemas.microsoft.com/office/drawing/2014/main" id="{75925000-9F7D-46E8-B6D4-D6BED8C0ECE5}"/>
               </a:ext>
             </a:extLst>
           </p:cNvPr>
@@ -16344,7 +16138,7 @@
           <p:cNvPr id="30" name="Picture 29" descr="A picture containing light, object&#10;&#10;Description automatically generated">
             <a:extLst>
               <a:ext uri="{FF2B5EF4-FFF2-40B4-BE49-F238E27FC236}">
-                <a16:creationId xmlns:a16="http://schemas.microsoft.com/office/drawing/2014/main" xmlns="" id="{8CAC995B-CB1D-41E1-B9C5-71EB226B62D3}"/>
+                <a16:creationId xmlns:a16="http://schemas.microsoft.com/office/drawing/2014/main" id="{8CAC995B-CB1D-41E1-B9C5-71EB226B62D3}"/>
               </a:ext>
             </a:extLst>
           </p:cNvPr>
@@ -16380,7 +16174,7 @@
           <p:cNvPr id="33" name="TextBox 32">
             <a:extLst>
               <a:ext uri="{FF2B5EF4-FFF2-40B4-BE49-F238E27FC236}">
-                <a16:creationId xmlns:a16="http://schemas.microsoft.com/office/drawing/2014/main" xmlns="" id="{17BE7B6F-E003-4CA1-8DB6-3198CEBEC011}"/>
+                <a16:creationId xmlns:a16="http://schemas.microsoft.com/office/drawing/2014/main" id="{17BE7B6F-E003-4CA1-8DB6-3198CEBEC011}"/>
               </a:ext>
             </a:extLst>
           </p:cNvPr>
@@ -16452,7 +16246,7 @@
           <p:cNvPr id="34" name="TextBox 33">
             <a:extLst>
               <a:ext uri="{FF2B5EF4-FFF2-40B4-BE49-F238E27FC236}">
-                <a16:creationId xmlns:a16="http://schemas.microsoft.com/office/drawing/2014/main" xmlns="" id="{2CC5F4BD-6A55-42C8-9619-A70AFE86DC90}"/>
+                <a16:creationId xmlns:a16="http://schemas.microsoft.com/office/drawing/2014/main" id="{2CC5F4BD-6A55-42C8-9619-A70AFE86DC90}"/>
               </a:ext>
             </a:extLst>
           </p:cNvPr>
@@ -16504,7 +16298,7 @@
           <p:cNvPr id="35" name="TextBox 34">
             <a:extLst>
               <a:ext uri="{FF2B5EF4-FFF2-40B4-BE49-F238E27FC236}">
-                <a16:creationId xmlns:a16="http://schemas.microsoft.com/office/drawing/2014/main" xmlns="" id="{C8A042FF-FDE8-49FF-9E40-9346EB7AC32C}"/>
+                <a16:creationId xmlns:a16="http://schemas.microsoft.com/office/drawing/2014/main" id="{C8A042FF-FDE8-49FF-9E40-9346EB7AC32C}"/>
               </a:ext>
             </a:extLst>
           </p:cNvPr>
@@ -17637,7 +17431,7 @@
           <p:cNvPr id="8" name="Picture 7" descr="A picture containing red, indoor, sitting, black&#10;&#10;Description automatically generated">
             <a:extLst>
               <a:ext uri="{FF2B5EF4-FFF2-40B4-BE49-F238E27FC236}">
-                <a16:creationId xmlns:a16="http://schemas.microsoft.com/office/drawing/2014/main" xmlns="" id="{8BF1B17D-B779-42FB-B96E-E82707B28D4C}"/>
+                <a16:creationId xmlns:a16="http://schemas.microsoft.com/office/drawing/2014/main" id="{8BF1B17D-B779-42FB-B96E-E82707B28D4C}"/>
               </a:ext>
             </a:extLst>
           </p:cNvPr>
@@ -17673,14 +17467,12 @@
           <p:cNvPr id="11" name="Diagram 10">
             <a:extLst>
               <a:ext uri="{FF2B5EF4-FFF2-40B4-BE49-F238E27FC236}">
-                <a16:creationId xmlns:a16="http://schemas.microsoft.com/office/drawing/2014/main" xmlns="" id="{B378D2F7-0D47-4E06-BA16-EB6208A74331}"/>
+                <a16:creationId xmlns:a16="http://schemas.microsoft.com/office/drawing/2014/main" id="{B378D2F7-0D47-4E06-BA16-EB6208A74331}"/>
               </a:ext>
             </a:extLst>
           </p:cNvPr>
           <p:cNvGraphicFramePr/>
-          <p:nvPr>
-            <p:extLst/>
-          </p:nvPr>
+          <p:nvPr/>
         </p:nvGraphicFramePr>
         <p:xfrm>
           <a:off x="1916481" y="1503080"/>
@@ -17697,7 +17489,7 @@
           <p:cNvPr id="15" name="Arrow: Curved Left 14">
             <a:extLst>
               <a:ext uri="{FF2B5EF4-FFF2-40B4-BE49-F238E27FC236}">
-                <a16:creationId xmlns:a16="http://schemas.microsoft.com/office/drawing/2014/main" xmlns="" id="{EDF1FC24-9878-4C65-A2B4-17931D9CC886}"/>
+                <a16:creationId xmlns:a16="http://schemas.microsoft.com/office/drawing/2014/main" id="{EDF1FC24-9878-4C65-A2B4-17931D9CC886}"/>
               </a:ext>
             </a:extLst>
           </p:cNvPr>
@@ -17751,7 +17543,7 @@
           <p:cNvPr id="16" name="Arrow: Curved Left 15">
             <a:extLst>
               <a:ext uri="{FF2B5EF4-FFF2-40B4-BE49-F238E27FC236}">
-                <a16:creationId xmlns:a16="http://schemas.microsoft.com/office/drawing/2014/main" xmlns="" id="{D7632291-78DF-412D-933F-1072A14CC901}"/>
+                <a16:creationId xmlns:a16="http://schemas.microsoft.com/office/drawing/2014/main" id="{D7632291-78DF-412D-933F-1072A14CC901}"/>
               </a:ext>
             </a:extLst>
           </p:cNvPr>
@@ -17805,7 +17597,7 @@
           <p:cNvPr id="18" name="Picture 17" descr="A picture containing map, text&#10;&#10;Description automatically generated">
             <a:extLst>
               <a:ext uri="{FF2B5EF4-FFF2-40B4-BE49-F238E27FC236}">
-                <a16:creationId xmlns:a16="http://schemas.microsoft.com/office/drawing/2014/main" xmlns="" id="{F07B1E80-0183-4D94-8D6F-E3A6907D39B8}"/>
+                <a16:creationId xmlns:a16="http://schemas.microsoft.com/office/drawing/2014/main" id="{F07B1E80-0183-4D94-8D6F-E3A6907D39B8}"/>
               </a:ext>
             </a:extLst>
           </p:cNvPr>
@@ -17841,7 +17633,7 @@
           <p:cNvPr id="20" name="TextBox 19">
             <a:extLst>
               <a:ext uri="{FF2B5EF4-FFF2-40B4-BE49-F238E27FC236}">
-                <a16:creationId xmlns:a16="http://schemas.microsoft.com/office/drawing/2014/main" xmlns="" id="{7361E451-12C6-49BD-8180-E8D2EBB3D4AF}"/>
+                <a16:creationId xmlns:a16="http://schemas.microsoft.com/office/drawing/2014/main" id="{7361E451-12C6-49BD-8180-E8D2EBB3D4AF}"/>
               </a:ext>
             </a:extLst>
           </p:cNvPr>
@@ -17877,7 +17669,7 @@
           <p:cNvPr id="21" name="Arrow: Curved Left 20">
             <a:extLst>
               <a:ext uri="{FF2B5EF4-FFF2-40B4-BE49-F238E27FC236}">
-                <a16:creationId xmlns:a16="http://schemas.microsoft.com/office/drawing/2014/main" xmlns="" id="{BFB96655-DBF3-476C-9C47-11477F5C0952}"/>
+                <a16:creationId xmlns:a16="http://schemas.microsoft.com/office/drawing/2014/main" id="{BFB96655-DBF3-476C-9C47-11477F5C0952}"/>
               </a:ext>
             </a:extLst>
           </p:cNvPr>
@@ -17931,7 +17723,7 @@
           <p:cNvPr id="22" name="Arrow: Curved Left 21">
             <a:extLst>
               <a:ext uri="{FF2B5EF4-FFF2-40B4-BE49-F238E27FC236}">
-                <a16:creationId xmlns:a16="http://schemas.microsoft.com/office/drawing/2014/main" xmlns="" id="{F481D1B5-68B3-436D-B8DD-A4B3077422EF}"/>
+                <a16:creationId xmlns:a16="http://schemas.microsoft.com/office/drawing/2014/main" id="{F481D1B5-68B3-436D-B8DD-A4B3077422EF}"/>
               </a:ext>
             </a:extLst>
           </p:cNvPr>
@@ -17985,7 +17777,7 @@
           <p:cNvPr id="23" name="Picture 22" descr="A picture containing map, text&#10;&#10;Description automatically generated">
             <a:extLst>
               <a:ext uri="{FF2B5EF4-FFF2-40B4-BE49-F238E27FC236}">
-                <a16:creationId xmlns:a16="http://schemas.microsoft.com/office/drawing/2014/main" xmlns="" id="{AA7EB2D5-034D-4BEC-B525-45C44C4E1759}"/>
+                <a16:creationId xmlns:a16="http://schemas.microsoft.com/office/drawing/2014/main" id="{AA7EB2D5-034D-4BEC-B525-45C44C4E1759}"/>
               </a:ext>
             </a:extLst>
           </p:cNvPr>
@@ -18021,7 +17813,7 @@
           <p:cNvPr id="24" name="Arrow: Curved Left 23">
             <a:extLst>
               <a:ext uri="{FF2B5EF4-FFF2-40B4-BE49-F238E27FC236}">
-                <a16:creationId xmlns:a16="http://schemas.microsoft.com/office/drawing/2014/main" xmlns="" id="{4D9B6E39-9C24-41B7-8068-D7CD965F9A4E}"/>
+                <a16:creationId xmlns:a16="http://schemas.microsoft.com/office/drawing/2014/main" id="{4D9B6E39-9C24-41B7-8068-D7CD965F9A4E}"/>
               </a:ext>
             </a:extLst>
           </p:cNvPr>
@@ -18075,7 +17867,7 @@
           <p:cNvPr id="25" name="Arrow: Curved Left 24">
             <a:extLst>
               <a:ext uri="{FF2B5EF4-FFF2-40B4-BE49-F238E27FC236}">
-                <a16:creationId xmlns:a16="http://schemas.microsoft.com/office/drawing/2014/main" xmlns="" id="{213E93D0-36E6-4524-B7C3-1A5C1AC695BB}"/>
+                <a16:creationId xmlns:a16="http://schemas.microsoft.com/office/drawing/2014/main" id="{213E93D0-36E6-4524-B7C3-1A5C1AC695BB}"/>
               </a:ext>
             </a:extLst>
           </p:cNvPr>
@@ -18129,7 +17921,7 @@
           <p:cNvPr id="28" name="Picture 27" descr="A picture containing light, sitting&#10;&#10;Description automatically generated">
             <a:extLst>
               <a:ext uri="{FF2B5EF4-FFF2-40B4-BE49-F238E27FC236}">
-                <a16:creationId xmlns:a16="http://schemas.microsoft.com/office/drawing/2014/main" xmlns="" id="{A4A364F4-3452-409C-8195-C451E49C3430}"/>
+                <a16:creationId xmlns:a16="http://schemas.microsoft.com/office/drawing/2014/main" id="{A4A364F4-3452-409C-8195-C451E49C3430}"/>
               </a:ext>
             </a:extLst>
           </p:cNvPr>
@@ -18165,7 +17957,7 @@
           <p:cNvPr id="32" name="Picture 31">
             <a:extLst>
               <a:ext uri="{FF2B5EF4-FFF2-40B4-BE49-F238E27FC236}">
-                <a16:creationId xmlns:a16="http://schemas.microsoft.com/office/drawing/2014/main" xmlns="" id="{AF8A7590-7BF6-43E2-988C-E58F97C27D84}"/>
+                <a16:creationId xmlns:a16="http://schemas.microsoft.com/office/drawing/2014/main" id="{AF8A7590-7BF6-43E2-988C-E58F97C27D84}"/>
               </a:ext>
             </a:extLst>
           </p:cNvPr>
@@ -18201,7 +17993,7 @@
           <p:cNvPr id="33" name="Flowchart: Connector 32">
             <a:extLst>
               <a:ext uri="{FF2B5EF4-FFF2-40B4-BE49-F238E27FC236}">
-                <a16:creationId xmlns:a16="http://schemas.microsoft.com/office/drawing/2014/main" xmlns="" id="{A0814B85-6D01-47BA-920D-5FF3890893C6}"/>
+                <a16:creationId xmlns:a16="http://schemas.microsoft.com/office/drawing/2014/main" id="{A0814B85-6D01-47BA-920D-5FF3890893C6}"/>
               </a:ext>
             </a:extLst>
           </p:cNvPr>
@@ -18248,7 +18040,7 @@
           <p:cNvPr id="34" name="Flowchart: Connector 33">
             <a:extLst>
               <a:ext uri="{FF2B5EF4-FFF2-40B4-BE49-F238E27FC236}">
-                <a16:creationId xmlns:a16="http://schemas.microsoft.com/office/drawing/2014/main" xmlns="" id="{AF6E5E53-9E15-41FD-8498-2A3B6387CA3A}"/>
+                <a16:creationId xmlns:a16="http://schemas.microsoft.com/office/drawing/2014/main" id="{AF6E5E53-9E15-41FD-8498-2A3B6387CA3A}"/>
               </a:ext>
             </a:extLst>
           </p:cNvPr>
@@ -18295,7 +18087,7 @@
           <p:cNvPr id="35" name="Flowchart: Connector 34">
             <a:extLst>
               <a:ext uri="{FF2B5EF4-FFF2-40B4-BE49-F238E27FC236}">
-                <a16:creationId xmlns:a16="http://schemas.microsoft.com/office/drawing/2014/main" xmlns="" id="{31E4C7B9-90E0-42B3-847D-2D7594524F0B}"/>
+                <a16:creationId xmlns:a16="http://schemas.microsoft.com/office/drawing/2014/main" id="{31E4C7B9-90E0-42B3-847D-2D7594524F0B}"/>
               </a:ext>
             </a:extLst>
           </p:cNvPr>
@@ -18342,7 +18134,7 @@
           <p:cNvPr id="36" name="Flowchart: Connector 35">
             <a:extLst>
               <a:ext uri="{FF2B5EF4-FFF2-40B4-BE49-F238E27FC236}">
-                <a16:creationId xmlns:a16="http://schemas.microsoft.com/office/drawing/2014/main" xmlns="" id="{1AAE7479-E60A-40F9-A2AA-E4CEF9CA58EB}"/>
+                <a16:creationId xmlns:a16="http://schemas.microsoft.com/office/drawing/2014/main" id="{1AAE7479-E60A-40F9-A2AA-E4CEF9CA58EB}"/>
               </a:ext>
             </a:extLst>
           </p:cNvPr>
@@ -18453,11 +18245,7 @@
             </a:r>
             <a:r>
               <a:rPr lang="de-DE" dirty="0"/>
-              <a:t> über den </a:t>
-            </a:r>
-            <a:r>
-              <a:rPr lang="de-DE" dirty="0" smtClean="0"/>
-              <a:t>Konstruktor.</a:t>
+              <a:t> über den Konstruktor.</a:t>
             </a:r>
           </a:p>
           <a:p>
@@ -18469,12 +18257,8 @@
           </a:p>
           <a:p>
             <a:r>
-              <a:rPr lang="de-DE" dirty="0" smtClean="0"/>
-              <a:t>Funktionen/Methoden </a:t>
-            </a:r>
-            <a:r>
-              <a:rPr lang="de-DE" dirty="0"/>
-              <a:t>der </a:t>
+              <a:rPr lang="de-DE" dirty="0"/>
+              <a:t>Funktionen/Methoden der </a:t>
             </a:r>
             <a:r>
               <a:rPr lang="de-DE" b="1" dirty="0" err="1"/>
@@ -19975,18 +19759,18 @@
 </file>
 
 <file path=customXml/item1.xml><?xml version="1.0" encoding="utf-8"?>
-<p:properties xmlns:p="http://schemas.microsoft.com/office/2006/metadata/properties" xmlns:xsi="http://www.w3.org/2001/XMLSchema-instance" xmlns:pc="http://schemas.microsoft.com/office/infopath/2007/PartnerControls">
-  <documentManagement/>
-</p:properties>
-</file>
-
-<file path=customXml/item2.xml><?xml version="1.0" encoding="utf-8"?>
 <?mso-contentType ?>
 <FormTemplates xmlns="http://schemas.microsoft.com/sharepoint/v3/contenttype/forms">
   <Display>DocumentLibraryForm</Display>
   <Edit>DocumentLibraryForm</Edit>
   <New>DocumentLibraryForm</New>
 </FormTemplates>
+</file>
+
+<file path=customXml/item2.xml><?xml version="1.0" encoding="utf-8"?>
+<p:properties xmlns:p="http://schemas.microsoft.com/office/2006/metadata/properties" xmlns:xsi="http://www.w3.org/2001/XMLSchema-instance" xmlns:pc="http://schemas.microsoft.com/office/infopath/2007/PartnerControls">
+  <documentManagement/>
+</p:properties>
 </file>
 
 <file path=customXml/item3.xml><?xml version="1.0" encoding="utf-8"?>
@@ -20104,6 +19888,14 @@
 </file>
 
 <file path=customXml/itemProps1.xml><?xml version="1.0" encoding="utf-8"?>
+<ds:datastoreItem xmlns:ds="http://schemas.openxmlformats.org/officeDocument/2006/customXml" ds:itemID="{20CAF0C3-C893-4631-969E-805C1C12F17E}">
+  <ds:schemaRefs>
+    <ds:schemaRef ds:uri="http://schemas.microsoft.com/sharepoint/v3/contenttype/forms"/>
+  </ds:schemaRefs>
+</ds:datastoreItem>
+</file>
+
+<file path=customXml/itemProps2.xml><?xml version="1.0" encoding="utf-8"?>
 <ds:datastoreItem xmlns:ds="http://schemas.openxmlformats.org/officeDocument/2006/customXml" ds:itemID="{6F65AD01-48E5-4010-AD48-B7D7CFBD789F}">
   <ds:schemaRefs>
     <ds:schemaRef ds:uri="http://schemas.microsoft.com/office/2006/documentManagement/types"/>
@@ -20114,14 +19906,6 @@
     <ds:schemaRef ds:uri="http://purl.org/dc/dcmitype/"/>
     <ds:schemaRef ds:uri="http://schemas.openxmlformats.org/package/2006/metadata/core-properties"/>
     <ds:schemaRef ds:uri="http://purl.org/dc/terms/"/>
-  </ds:schemaRefs>
-</ds:datastoreItem>
-</file>
-
-<file path=customXml/itemProps2.xml><?xml version="1.0" encoding="utf-8"?>
-<ds:datastoreItem xmlns:ds="http://schemas.openxmlformats.org/officeDocument/2006/customXml" ds:itemID="{20CAF0C3-C893-4631-969E-805C1C12F17E}">
-  <ds:schemaRefs>
-    <ds:schemaRef ds:uri="http://schemas.microsoft.com/sharepoint/v3/contenttype/forms"/>
   </ds:schemaRefs>
 </ds:datastoreItem>
 </file>

</xml_diff>